<commit_message>
adição de slide sobre Estrutura Touch; adição de referências
</commit_message>
<xml_diff>
--- a/touch-input.pptx
+++ b/touch-input.pptx
@@ -5,16 +5,14 @@
     <p:sldMasterId id="2147483648" r:id="rId1"/>
   </p:sldMasterIdLst>
   <p:notesMasterIdLst>
-    <p:notesMasterId r:id="rId9"/>
+    <p:notesMasterId r:id="rId7"/>
   </p:notesMasterIdLst>
   <p:sldIdLst>
     <p:sldId id="256" r:id="rId2"/>
     <p:sldId id="298" r:id="rId3"/>
     <p:sldId id="356" r:id="rId4"/>
-    <p:sldId id="353" r:id="rId5"/>
-    <p:sldId id="354" r:id="rId6"/>
-    <p:sldId id="355" r:id="rId7"/>
-    <p:sldId id="352" r:id="rId8"/>
+    <p:sldId id="357" r:id="rId5"/>
+    <p:sldId id="352" r:id="rId6"/>
   </p:sldIdLst>
   <p:sldSz cx="12192000" cy="6858000"/>
   <p:notesSz cx="6858000" cy="9144000"/>
@@ -203,7 +201,7 @@
           <a:p>
             <a:fld id="{94D3EB41-CF60-4C9F-BD83-AE56FA0945EB}" type="datetimeFigureOut">
               <a:rPr lang="pt-BR" smtClean="0"/>
-              <a:t>01/08/2019</a:t>
+              <a:t>02/08/2019</a:t>
             </a:fld>
             <a:endParaRPr lang="pt-BR"/>
           </a:p>
@@ -361,7 +359,7 @@
           <a:p>
             <a:fld id="{020F486D-935E-4125-8FD7-C735663CC7DE}" type="slidenum">
               <a:rPr lang="pt-BR" smtClean="0"/>
-              <a:t>‹nº›</a:t>
+              <a:t>‹#›</a:t>
             </a:fld>
             <a:endParaRPr lang="pt-BR"/>
           </a:p>
@@ -713,7 +711,7 @@
           <a:p>
             <a:fld id="{9642BF85-54FF-46CE-B398-87F998CFD60B}" type="datetimeFigureOut">
               <a:rPr lang="pt-BR" smtClean="0"/>
-              <a:t>01/08/2019</a:t>
+              <a:t>02/08/2019</a:t>
             </a:fld>
             <a:endParaRPr lang="pt-BR"/>
           </a:p>
@@ -755,7 +753,7 @@
           <a:p>
             <a:fld id="{29185252-FBA3-417A-8652-C405B89605D8}" type="slidenum">
               <a:rPr lang="pt-BR" smtClean="0"/>
-              <a:t>‹nº›</a:t>
+              <a:t>‹#›</a:t>
             </a:fld>
             <a:endParaRPr lang="pt-BR"/>
           </a:p>
@@ -881,7 +879,7 @@
           <a:p>
             <a:fld id="{9642BF85-54FF-46CE-B398-87F998CFD60B}" type="datetimeFigureOut">
               <a:rPr lang="pt-BR" smtClean="0"/>
-              <a:t>01/08/2019</a:t>
+              <a:t>02/08/2019</a:t>
             </a:fld>
             <a:endParaRPr lang="pt-BR"/>
           </a:p>
@@ -923,7 +921,7 @@
           <a:p>
             <a:fld id="{29185252-FBA3-417A-8652-C405B89605D8}" type="slidenum">
               <a:rPr lang="pt-BR" smtClean="0"/>
-              <a:t>‹nº›</a:t>
+              <a:t>‹#›</a:t>
             </a:fld>
             <a:endParaRPr lang="pt-BR"/>
           </a:p>
@@ -1059,7 +1057,7 @@
           <a:p>
             <a:fld id="{9642BF85-54FF-46CE-B398-87F998CFD60B}" type="datetimeFigureOut">
               <a:rPr lang="pt-BR" smtClean="0"/>
-              <a:t>01/08/2019</a:t>
+              <a:t>02/08/2019</a:t>
             </a:fld>
             <a:endParaRPr lang="pt-BR"/>
           </a:p>
@@ -1101,7 +1099,7 @@
           <a:p>
             <a:fld id="{29185252-FBA3-417A-8652-C405B89605D8}" type="slidenum">
               <a:rPr lang="pt-BR" smtClean="0"/>
-              <a:t>‹nº›</a:t>
+              <a:t>‹#›</a:t>
             </a:fld>
             <a:endParaRPr lang="pt-BR"/>
           </a:p>
@@ -1396,7 +1394,7 @@
           <a:p>
             <a:fld id="{9642BF85-54FF-46CE-B398-87F998CFD60B}" type="datetimeFigureOut">
               <a:rPr lang="pt-BR" smtClean="0"/>
-              <a:t>01/08/2019</a:t>
+              <a:t>02/08/2019</a:t>
             </a:fld>
             <a:endParaRPr lang="pt-BR"/>
           </a:p>
@@ -1438,7 +1436,7 @@
           <a:p>
             <a:fld id="{29185252-FBA3-417A-8652-C405B89605D8}" type="slidenum">
               <a:rPr lang="pt-BR" smtClean="0"/>
-              <a:t>‹nº›</a:t>
+              <a:t>‹#›</a:t>
             </a:fld>
             <a:endParaRPr lang="pt-BR"/>
           </a:p>
@@ -1667,7 +1665,7 @@
           <a:p>
             <a:fld id="{9642BF85-54FF-46CE-B398-87F998CFD60B}" type="datetimeFigureOut">
               <a:rPr lang="pt-BR" smtClean="0"/>
-              <a:t>01/08/2019</a:t>
+              <a:t>02/08/2019</a:t>
             </a:fld>
             <a:endParaRPr lang="pt-BR"/>
           </a:p>
@@ -1709,7 +1707,7 @@
           <a:p>
             <a:fld id="{29185252-FBA3-417A-8652-C405B89605D8}" type="slidenum">
               <a:rPr lang="pt-BR" smtClean="0"/>
-              <a:t>‹nº›</a:t>
+              <a:t>‹#›</a:t>
             </a:fld>
             <a:endParaRPr lang="pt-BR"/>
           </a:p>
@@ -1913,7 +1911,7 @@
           <a:p>
             <a:fld id="{9642BF85-54FF-46CE-B398-87F998CFD60B}" type="datetimeFigureOut">
               <a:rPr lang="pt-BR" smtClean="0"/>
-              <a:t>01/08/2019</a:t>
+              <a:t>02/08/2019</a:t>
             </a:fld>
             <a:endParaRPr lang="pt-BR"/>
           </a:p>
@@ -1955,7 +1953,7 @@
           <a:p>
             <a:fld id="{29185252-FBA3-417A-8652-C405B89605D8}" type="slidenum">
               <a:rPr lang="pt-BR" smtClean="0"/>
-              <a:t>‹nº›</a:t>
+              <a:t>‹#›</a:t>
             </a:fld>
             <a:endParaRPr lang="pt-BR"/>
           </a:p>
@@ -2277,7 +2275,7 @@
           <a:p>
             <a:fld id="{9642BF85-54FF-46CE-B398-87F998CFD60B}" type="datetimeFigureOut">
               <a:rPr lang="pt-BR" smtClean="0"/>
-              <a:t>01/08/2019</a:t>
+              <a:t>02/08/2019</a:t>
             </a:fld>
             <a:endParaRPr lang="pt-BR"/>
           </a:p>
@@ -2319,7 +2317,7 @@
           <a:p>
             <a:fld id="{29185252-FBA3-417A-8652-C405B89605D8}" type="slidenum">
               <a:rPr lang="pt-BR" smtClean="0"/>
-              <a:t>‹nº›</a:t>
+              <a:t>‹#›</a:t>
             </a:fld>
             <a:endParaRPr lang="pt-BR"/>
           </a:p>
@@ -2411,7 +2409,7 @@
           <a:p>
             <a:fld id="{9642BF85-54FF-46CE-B398-87F998CFD60B}" type="datetimeFigureOut">
               <a:rPr lang="pt-BR" smtClean="0"/>
-              <a:t>01/08/2019</a:t>
+              <a:t>02/08/2019</a:t>
             </a:fld>
             <a:endParaRPr lang="pt-BR"/>
           </a:p>
@@ -2453,7 +2451,7 @@
           <a:p>
             <a:fld id="{29185252-FBA3-417A-8652-C405B89605D8}" type="slidenum">
               <a:rPr lang="pt-BR" smtClean="0"/>
-              <a:t>‹nº›</a:t>
+              <a:t>‹#›</a:t>
             </a:fld>
             <a:endParaRPr lang="pt-BR"/>
           </a:p>
@@ -2506,7 +2504,7 @@
           <a:p>
             <a:fld id="{9642BF85-54FF-46CE-B398-87F998CFD60B}" type="datetimeFigureOut">
               <a:rPr lang="pt-BR" smtClean="0"/>
-              <a:t>01/08/2019</a:t>
+              <a:t>02/08/2019</a:t>
             </a:fld>
             <a:endParaRPr lang="pt-BR"/>
           </a:p>
@@ -2548,7 +2546,7 @@
           <a:p>
             <a:fld id="{29185252-FBA3-417A-8652-C405B89605D8}" type="slidenum">
               <a:rPr lang="pt-BR" smtClean="0"/>
-              <a:t>‹nº›</a:t>
+              <a:t>‹#›</a:t>
             </a:fld>
             <a:endParaRPr lang="pt-BR"/>
           </a:p>
@@ -2781,7 +2779,7 @@
           <a:p>
             <a:fld id="{9642BF85-54FF-46CE-B398-87F998CFD60B}" type="datetimeFigureOut">
               <a:rPr lang="pt-BR" smtClean="0"/>
-              <a:t>01/08/2019</a:t>
+              <a:t>02/08/2019</a:t>
             </a:fld>
             <a:endParaRPr lang="pt-BR"/>
           </a:p>
@@ -2823,7 +2821,7 @@
           <a:p>
             <a:fld id="{29185252-FBA3-417A-8652-C405B89605D8}" type="slidenum">
               <a:rPr lang="pt-BR" smtClean="0"/>
-              <a:t>‹nº›</a:t>
+              <a:t>‹#›</a:t>
             </a:fld>
             <a:endParaRPr lang="pt-BR"/>
           </a:p>
@@ -3033,7 +3031,7 @@
           <a:p>
             <a:fld id="{9642BF85-54FF-46CE-B398-87F998CFD60B}" type="datetimeFigureOut">
               <a:rPr lang="pt-BR" smtClean="0"/>
-              <a:t>01/08/2019</a:t>
+              <a:t>02/08/2019</a:t>
             </a:fld>
             <a:endParaRPr lang="pt-BR"/>
           </a:p>
@@ -3075,7 +3073,7 @@
           <a:p>
             <a:fld id="{29185252-FBA3-417A-8652-C405B89605D8}" type="slidenum">
               <a:rPr lang="pt-BR" smtClean="0"/>
-              <a:t>‹nº›</a:t>
+              <a:t>‹#›</a:t>
             </a:fld>
             <a:endParaRPr lang="pt-BR"/>
           </a:p>
@@ -3253,7 +3251,7 @@
           <a:p>
             <a:fld id="{9642BF85-54FF-46CE-B398-87F998CFD60B}" type="datetimeFigureOut">
               <a:rPr lang="pt-BR" smtClean="0"/>
-              <a:t>01/08/2019</a:t>
+              <a:t>02/08/2019</a:t>
             </a:fld>
             <a:endParaRPr lang="pt-BR"/>
           </a:p>
@@ -3331,7 +3329,7 @@
           <a:p>
             <a:fld id="{29185252-FBA3-417A-8652-C405B89605D8}" type="slidenum">
               <a:rPr lang="pt-BR" smtClean="0"/>
-              <a:t>‹nº›</a:t>
+              <a:t>‹#›</a:t>
             </a:fld>
             <a:endParaRPr lang="pt-BR"/>
           </a:p>
@@ -3692,11 +3690,11 @@
           <a:lstStyle/>
           <a:p>
             <a:r>
-              <a:rPr lang="pt-BR" dirty="0" smtClean="0"/>
+              <a:rPr lang="pt-BR" dirty="0"/>
               <a:t>Tela </a:t>
             </a:r>
             <a:r>
-              <a:rPr lang="pt-BR" dirty="0" err="1" smtClean="0"/>
+              <a:rPr lang="pt-BR" dirty="0" err="1"/>
               <a:t>Multitouch</a:t>
             </a:r>
             <a:endParaRPr lang="pt-BR" dirty="0"/>
@@ -3748,13 +3746,6 @@
   <p:clrMapOvr>
     <a:masterClrMapping/>
   </p:clrMapOvr>
-  <p:timing>
-    <p:tnLst>
-      <p:par>
-        <p:cTn id="1" dur="indefinite" restart="never" nodeType="tmRoot"/>
-      </p:par>
-    </p:tnLst>
-  </p:timing>
 </p:sld>
 </file>
 
@@ -3791,10 +3782,9 @@
           <a:lstStyle/>
           <a:p>
             <a:r>
-              <a:rPr lang="pt-BR" dirty="0" smtClean="0"/>
+              <a:rPr lang="pt-BR" dirty="0"/>
               <a:t>Entrada de dados</a:t>
             </a:r>
-            <a:endParaRPr lang="pt-BR" dirty="0"/>
           </a:p>
         </p:txBody>
       </p:sp>
@@ -3816,40 +3806,39 @@
           <a:lstStyle/>
           <a:p>
             <a:r>
-              <a:rPr lang="pt-BR" dirty="0" smtClean="0"/>
+              <a:rPr lang="pt-BR" dirty="0"/>
               <a:t>Dispositivos iPhone, </a:t>
             </a:r>
             <a:r>
-              <a:rPr lang="pt-BR" dirty="0" err="1" smtClean="0"/>
+              <a:rPr lang="pt-BR" dirty="0" err="1"/>
               <a:t>iPad</a:t>
             </a:r>
             <a:r>
-              <a:rPr lang="pt-BR" dirty="0" smtClean="0"/>
+              <a:rPr lang="pt-BR" dirty="0"/>
               <a:t> e </a:t>
             </a:r>
             <a:r>
-              <a:rPr lang="pt-BR" dirty="0" err="1" smtClean="0"/>
+              <a:rPr lang="pt-BR" dirty="0" err="1"/>
               <a:t>Ipod</a:t>
             </a:r>
             <a:r>
-              <a:rPr lang="pt-BR" dirty="0" smtClean="0"/>
+              <a:rPr lang="pt-BR" dirty="0"/>
               <a:t> podem rastrear até cinco dedos tocando na tela simultaneamente.</a:t>
             </a:r>
           </a:p>
           <a:p>
             <a:r>
-              <a:rPr lang="pt-BR" dirty="0" smtClean="0"/>
+              <a:rPr lang="pt-BR" dirty="0"/>
               <a:t>Enquanto em dispositivos </a:t>
             </a:r>
             <a:r>
-              <a:rPr lang="pt-BR" dirty="0" err="1" smtClean="0"/>
+              <a:rPr lang="pt-BR" dirty="0" err="1"/>
               <a:t>Android</a:t>
             </a:r>
             <a:r>
-              <a:rPr lang="pt-BR" dirty="0" smtClean="0"/>
+              <a:rPr lang="pt-BR" dirty="0"/>
               <a:t>, o limite de toques rastreáveis varia de 2 a 5, de acordo com a idade do mesmo.</a:t>
             </a:r>
-            <a:endParaRPr lang="pt-BR" dirty="0"/>
           </a:p>
         </p:txBody>
       </p:sp>
@@ -3863,13 +3852,6 @@
   <p:clrMapOvr>
     <a:masterClrMapping/>
   </p:clrMapOvr>
-  <p:timing>
-    <p:tnLst>
-      <p:par>
-        <p:cTn id="1" dur="indefinite" restart="never" nodeType="tmRoot"/>
-      </p:par>
-    </p:tnLst>
-  </p:timing>
 </p:sld>
 </file>
 
@@ -3906,10 +3888,9 @@
           <a:lstStyle/>
           <a:p>
             <a:r>
-              <a:rPr lang="pt-BR" dirty="0" smtClean="0"/>
+              <a:rPr lang="pt-BR" dirty="0"/>
               <a:t>Entrada de dados</a:t>
             </a:r>
-            <a:endParaRPr lang="pt-BR" dirty="0"/>
           </a:p>
         </p:txBody>
       </p:sp>
@@ -3931,32 +3912,31 @@
           <a:lstStyle/>
           <a:p>
             <a:r>
-              <a:rPr lang="pt-BR" dirty="0" smtClean="0"/>
+              <a:rPr lang="pt-BR" dirty="0"/>
               <a:t>É possível obter o status de cada dedo tocando a tela durante o último frame acessando a propriedade </a:t>
             </a:r>
             <a:r>
-              <a:rPr lang="pt-BR" b="1" i="1" dirty="0" err="1" smtClean="0"/>
+              <a:rPr lang="pt-BR" b="1" i="1" dirty="0" err="1"/>
               <a:t>Input.toches</a:t>
             </a:r>
             <a:r>
-              <a:rPr lang="pt-BR" dirty="0" smtClean="0"/>
+              <a:rPr lang="pt-BR" dirty="0"/>
               <a:t>.</a:t>
             </a:r>
           </a:p>
           <a:p>
             <a:r>
-              <a:rPr lang="pt-BR" dirty="0" smtClean="0"/>
+              <a:rPr lang="pt-BR" dirty="0"/>
               <a:t>Ela retorna uma lista de objetos </a:t>
             </a:r>
             <a:r>
-              <a:rPr lang="pt-BR" b="1" i="1" dirty="0" err="1" smtClean="0"/>
+              <a:rPr lang="pt-BR" b="1" i="1" dirty="0" err="1"/>
               <a:t>Touch</a:t>
             </a:r>
             <a:r>
-              <a:rPr lang="pt-BR" dirty="0" smtClean="0"/>
+              <a:rPr lang="pt-BR" dirty="0"/>
               <a:t>, representando o status de todos os toques na tela durante o último frame.</a:t>
             </a:r>
-            <a:endParaRPr lang="pt-BR" dirty="0"/>
           </a:p>
         </p:txBody>
       </p:sp>
@@ -3970,13 +3950,6 @@
   <p:clrMapOvr>
     <a:masterClrMapping/>
   </p:clrMapOvr>
-  <p:timing>
-    <p:tnLst>
-      <p:par>
-        <p:cTn id="1" dur="indefinite" restart="never" nodeType="tmRoot"/>
-      </p:par>
-    </p:tnLst>
-  </p:timing>
 </p:sld>
 </file>
 
@@ -4014,7 +3987,7 @@
           <a:p>
             <a:r>
               <a:rPr lang="pt-BR" dirty="0"/>
-              <a:t>Correspondência de eixos</a:t>
+              <a:t>Estrutura Touch</a:t>
             </a:r>
           </a:p>
         </p:txBody>
@@ -4029,7 +4002,12 @@
             <p:ph idx="1"/>
           </p:nvPr>
         </p:nvSpPr>
-        <p:spPr/>
+        <p:spPr>
+          <a:xfrm>
+            <a:off x="317694" y="1291053"/>
+            <a:ext cx="11705493" cy="1407177"/>
+          </a:xfrm>
+        </p:spPr>
         <p:txBody>
           <a:bodyPr>
             <a:normAutofit/>
@@ -4037,44 +4015,320 @@
           <a:lstStyle/>
           <a:p>
             <a:r>
-              <a:rPr lang="pt-BR" dirty="0" smtClean="0"/>
-              <a:t>Essa orientação é obtida por meio da propriedade </a:t>
-            </a:r>
-            <a:r>
-              <a:rPr lang="pt-BR" b="1" i="1" dirty="0" err="1" smtClean="0"/>
-              <a:t>acceleration</a:t>
-            </a:r>
-            <a:r>
-              <a:rPr lang="pt-BR" dirty="0" smtClean="0"/>
-              <a:t>, do tipo Vector3, da classe </a:t>
-            </a:r>
-            <a:r>
-              <a:rPr lang="pt-BR" b="1" i="1" dirty="0" smtClean="0"/>
-              <a:t>Input</a:t>
-            </a:r>
-            <a:r>
-              <a:rPr lang="pt-BR" dirty="0" smtClean="0"/>
-              <a:t>.</a:t>
-            </a:r>
-          </a:p>
-          <a:p>
-            <a:r>
-              <a:rPr lang="pt-BR" dirty="0" smtClean="0"/>
-              <a:t>Nessa classe, os eixos do acelerômetro são configurados para corresponder aos eixos do </a:t>
-            </a:r>
-            <a:r>
-              <a:rPr lang="pt-BR" dirty="0" err="1" smtClean="0"/>
-              <a:t>Unity</a:t>
-            </a:r>
-            <a:r>
-              <a:rPr lang="pt-BR" dirty="0" smtClean="0"/>
-              <a:t>.</a:t>
-            </a:r>
-          </a:p>
-          <a:p>
-            <a:r>
-              <a:rPr lang="pt-BR" dirty="0" smtClean="0"/>
-              <a:t>Essa correspondência é mantida tanto no modo retrato como no modo paisagem.</a:t>
+              <a:rPr lang="pt-BR" dirty="0"/>
+              <a:t>Descreve o status de um dedo tocando a tela.</a:t>
+            </a:r>
+          </a:p>
+          <a:p>
+            <a:r>
+              <a:rPr lang="pt-BR" dirty="0"/>
+              <a:t>Principais propriedades:</a:t>
+            </a:r>
+          </a:p>
+        </p:txBody>
+      </p:sp>
+      <p:sp>
+        <p:nvSpPr>
+          <p:cNvPr id="4" name="Espaço Reservado para Conteúdo 5">
+            <a:extLst>
+              <a:ext uri="{FF2B5EF4-FFF2-40B4-BE49-F238E27FC236}">
+                <a16:creationId xmlns:a16="http://schemas.microsoft.com/office/drawing/2014/main" id="{0BF99C16-817B-412A-8B52-8F47E91EB87D}"/>
+              </a:ext>
+            </a:extLst>
+          </p:cNvPr>
+          <p:cNvSpPr txBox="1">
+            <a:spLocks/>
+          </p:cNvSpPr>
+          <p:nvPr/>
+        </p:nvSpPr>
+        <p:spPr>
+          <a:xfrm>
+            <a:off x="667062" y="3122350"/>
+            <a:ext cx="10857877" cy="2738803"/>
+          </a:xfrm>
+          <a:prstGeom prst="rect">
+            <a:avLst/>
+          </a:prstGeom>
+        </p:spPr>
+        <p:txBody>
+          <a:bodyPr vert="horz" lIns="91440" tIns="45720" rIns="91440" bIns="45720" numCol="2" spcCol="1828800" rtlCol="0">
+            <a:normAutofit/>
+          </a:bodyPr>
+          <a:lstStyle>
+            <a:lvl1pPr marL="0" indent="0" algn="ctr" defTabSz="914400" rtl="0" eaLnBrk="1" latinLnBrk="0" hangingPunct="1">
+              <a:lnSpc>
+                <a:spcPct val="100000"/>
+              </a:lnSpc>
+              <a:spcBef>
+                <a:spcPts val="1000"/>
+              </a:spcBef>
+              <a:spcAft>
+                <a:spcPts val="1000"/>
+              </a:spcAft>
+              <a:buFont typeface="Arial" panose="020B0604020202020204" pitchFamily="34" charset="0"/>
+              <a:buNone/>
+              <a:defRPr sz="3200" kern="1200">
+                <a:solidFill>
+                  <a:schemeClr val="accent1">
+                    <a:lumMod val="50000"/>
+                  </a:schemeClr>
+                </a:solidFill>
+                <a:latin typeface="Helvetica" panose="020B0604020202020204" pitchFamily="34" charset="0"/>
+                <a:ea typeface="+mn-ea"/>
+                <a:cs typeface="Helvetica" panose="020B0604020202020204" pitchFamily="34" charset="0"/>
+              </a:defRPr>
+            </a:lvl1pPr>
+            <a:lvl2pPr marL="685800" indent="-228600" algn="l" defTabSz="914400" rtl="0" eaLnBrk="1" latinLnBrk="0" hangingPunct="1">
+              <a:lnSpc>
+                <a:spcPct val="90000"/>
+              </a:lnSpc>
+              <a:spcBef>
+                <a:spcPts val="500"/>
+              </a:spcBef>
+              <a:buFont typeface="Arial" panose="020B0604020202020204" pitchFamily="34" charset="0"/>
+              <a:buChar char="•"/>
+              <a:defRPr sz="2400" kern="1200">
+                <a:solidFill>
+                  <a:schemeClr val="accent1">
+                    <a:lumMod val="50000"/>
+                  </a:schemeClr>
+                </a:solidFill>
+                <a:latin typeface="Helvetica" panose="020B0604020202020204" pitchFamily="34" charset="0"/>
+                <a:ea typeface="+mn-ea"/>
+                <a:cs typeface="Helvetica" panose="020B0604020202020204" pitchFamily="34" charset="0"/>
+              </a:defRPr>
+            </a:lvl2pPr>
+            <a:lvl3pPr marL="1143000" indent="-228600" algn="l" defTabSz="914400" rtl="0" eaLnBrk="1" latinLnBrk="0" hangingPunct="1">
+              <a:lnSpc>
+                <a:spcPct val="90000"/>
+              </a:lnSpc>
+              <a:spcBef>
+                <a:spcPts val="500"/>
+              </a:spcBef>
+              <a:buFont typeface="Arial" panose="020B0604020202020204" pitchFamily="34" charset="0"/>
+              <a:buChar char="•"/>
+              <a:defRPr sz="2000" kern="1200">
+                <a:solidFill>
+                  <a:schemeClr val="accent1">
+                    <a:lumMod val="50000"/>
+                  </a:schemeClr>
+                </a:solidFill>
+                <a:latin typeface="Helvetica" panose="020B0604020202020204" pitchFamily="34" charset="0"/>
+                <a:ea typeface="+mn-ea"/>
+                <a:cs typeface="Helvetica" panose="020B0604020202020204" pitchFamily="34" charset="0"/>
+              </a:defRPr>
+            </a:lvl3pPr>
+            <a:lvl4pPr marL="1600200" indent="-228600" algn="l" defTabSz="914400" rtl="0" eaLnBrk="1" latinLnBrk="0" hangingPunct="1">
+              <a:lnSpc>
+                <a:spcPct val="90000"/>
+              </a:lnSpc>
+              <a:spcBef>
+                <a:spcPts val="500"/>
+              </a:spcBef>
+              <a:buFont typeface="Arial" panose="020B0604020202020204" pitchFamily="34" charset="0"/>
+              <a:buChar char="•"/>
+              <a:defRPr sz="1800" kern="1200">
+                <a:solidFill>
+                  <a:schemeClr val="accent1">
+                    <a:lumMod val="50000"/>
+                  </a:schemeClr>
+                </a:solidFill>
+                <a:latin typeface="Helvetica" panose="020B0604020202020204" pitchFamily="34" charset="0"/>
+                <a:ea typeface="+mn-ea"/>
+                <a:cs typeface="Helvetica" panose="020B0604020202020204" pitchFamily="34" charset="0"/>
+              </a:defRPr>
+            </a:lvl4pPr>
+            <a:lvl5pPr marL="2057400" indent="-228600" algn="l" defTabSz="914400" rtl="0" eaLnBrk="1" latinLnBrk="0" hangingPunct="1">
+              <a:lnSpc>
+                <a:spcPct val="90000"/>
+              </a:lnSpc>
+              <a:spcBef>
+                <a:spcPts val="500"/>
+              </a:spcBef>
+              <a:buFont typeface="Arial" panose="020B0604020202020204" pitchFamily="34" charset="0"/>
+              <a:buChar char="•"/>
+              <a:defRPr sz="1800" kern="1200">
+                <a:solidFill>
+                  <a:schemeClr val="accent1">
+                    <a:lumMod val="50000"/>
+                  </a:schemeClr>
+                </a:solidFill>
+                <a:latin typeface="Helvetica" panose="020B0604020202020204" pitchFamily="34" charset="0"/>
+                <a:ea typeface="+mn-ea"/>
+                <a:cs typeface="Helvetica" panose="020B0604020202020204" pitchFamily="34" charset="0"/>
+              </a:defRPr>
+            </a:lvl5pPr>
+            <a:lvl6pPr marL="2514600" indent="-228600" algn="l" defTabSz="914400" rtl="0" eaLnBrk="1" latinLnBrk="0" hangingPunct="1">
+              <a:lnSpc>
+                <a:spcPct val="90000"/>
+              </a:lnSpc>
+              <a:spcBef>
+                <a:spcPts val="500"/>
+              </a:spcBef>
+              <a:buFont typeface="Arial" panose="020B0604020202020204" pitchFamily="34" charset="0"/>
+              <a:buChar char="•"/>
+              <a:defRPr sz="1800" kern="1200">
+                <a:solidFill>
+                  <a:schemeClr val="tx1"/>
+                </a:solidFill>
+                <a:latin typeface="+mn-lt"/>
+                <a:ea typeface="+mn-ea"/>
+                <a:cs typeface="+mn-cs"/>
+              </a:defRPr>
+            </a:lvl6pPr>
+            <a:lvl7pPr marL="2971800" indent="-228600" algn="l" defTabSz="914400" rtl="0" eaLnBrk="1" latinLnBrk="0" hangingPunct="1">
+              <a:lnSpc>
+                <a:spcPct val="90000"/>
+              </a:lnSpc>
+              <a:spcBef>
+                <a:spcPts val="500"/>
+              </a:spcBef>
+              <a:buFont typeface="Arial" panose="020B0604020202020204" pitchFamily="34" charset="0"/>
+              <a:buChar char="•"/>
+              <a:defRPr sz="1800" kern="1200">
+                <a:solidFill>
+                  <a:schemeClr val="tx1"/>
+                </a:solidFill>
+                <a:latin typeface="+mn-lt"/>
+                <a:ea typeface="+mn-ea"/>
+                <a:cs typeface="+mn-cs"/>
+              </a:defRPr>
+            </a:lvl7pPr>
+            <a:lvl8pPr marL="3429000" indent="-228600" algn="l" defTabSz="914400" rtl="0" eaLnBrk="1" latinLnBrk="0" hangingPunct="1">
+              <a:lnSpc>
+                <a:spcPct val="90000"/>
+              </a:lnSpc>
+              <a:spcBef>
+                <a:spcPts val="500"/>
+              </a:spcBef>
+              <a:buFont typeface="Arial" panose="020B0604020202020204" pitchFamily="34" charset="0"/>
+              <a:buChar char="•"/>
+              <a:defRPr sz="1800" kern="1200">
+                <a:solidFill>
+                  <a:schemeClr val="tx1"/>
+                </a:solidFill>
+                <a:latin typeface="+mn-lt"/>
+                <a:ea typeface="+mn-ea"/>
+                <a:cs typeface="+mn-cs"/>
+              </a:defRPr>
+            </a:lvl8pPr>
+            <a:lvl9pPr marL="3886200" indent="-228600" algn="l" defTabSz="914400" rtl="0" eaLnBrk="1" latinLnBrk="0" hangingPunct="1">
+              <a:lnSpc>
+                <a:spcPct val="90000"/>
+              </a:lnSpc>
+              <a:spcBef>
+                <a:spcPts val="500"/>
+              </a:spcBef>
+              <a:buFont typeface="Arial" panose="020B0604020202020204" pitchFamily="34" charset="0"/>
+              <a:buChar char="•"/>
+              <a:defRPr sz="1800" kern="1200">
+                <a:solidFill>
+                  <a:schemeClr val="tx1"/>
+                </a:solidFill>
+                <a:latin typeface="+mn-lt"/>
+                <a:ea typeface="+mn-ea"/>
+                <a:cs typeface="+mn-cs"/>
+              </a:defRPr>
+            </a:lvl9pPr>
+          </a:lstStyle>
+          <a:p>
+            <a:pPr marL="457200" indent="-457200" algn="l">
+              <a:buFont typeface="Arial" panose="020B0604020202020204" pitchFamily="34" charset="0"/>
+              <a:buChar char="•"/>
+            </a:pPr>
+            <a:r>
+              <a:rPr lang="pt-BR" dirty="0"/>
+              <a:t>Vector2 </a:t>
+            </a:r>
+            <a:r>
+              <a:rPr lang="pt-BR" dirty="0" err="1"/>
+              <a:t>deltaPosition</a:t>
+            </a:r>
+            <a:endParaRPr lang="pt-BR" dirty="0"/>
+          </a:p>
+          <a:p>
+            <a:pPr marL="457200" indent="-457200" algn="l">
+              <a:buFont typeface="Arial" panose="020B0604020202020204" pitchFamily="34" charset="0"/>
+              <a:buChar char="•"/>
+            </a:pPr>
+            <a:r>
+              <a:rPr lang="pt-BR" dirty="0" err="1"/>
+              <a:t>float</a:t>
+            </a:r>
+            <a:r>
+              <a:rPr lang="pt-BR" dirty="0"/>
+              <a:t> </a:t>
+            </a:r>
+            <a:r>
+              <a:rPr lang="pt-BR" dirty="0" err="1"/>
+              <a:t>deltaTime</a:t>
+            </a:r>
+            <a:endParaRPr lang="pt-BR" dirty="0"/>
+          </a:p>
+          <a:p>
+            <a:pPr marL="457200" indent="-457200" algn="l">
+              <a:buFont typeface="Arial" panose="020B0604020202020204" pitchFamily="34" charset="0"/>
+              <a:buChar char="•"/>
+            </a:pPr>
+            <a:r>
+              <a:rPr lang="pt-BR" dirty="0" err="1"/>
+              <a:t>int</a:t>
+            </a:r>
+            <a:r>
+              <a:rPr lang="pt-BR" dirty="0"/>
+              <a:t> </a:t>
+            </a:r>
+            <a:r>
+              <a:rPr lang="pt-BR" dirty="0" err="1"/>
+              <a:t>fingerId</a:t>
+            </a:r>
+            <a:endParaRPr lang="pt-BR" dirty="0"/>
+          </a:p>
+          <a:p>
+            <a:pPr marL="457200" indent="-457200" algn="l">
+              <a:buFont typeface="Arial" panose="020B0604020202020204" pitchFamily="34" charset="0"/>
+              <a:buChar char="•"/>
+            </a:pPr>
+            <a:r>
+              <a:rPr lang="pt-BR" dirty="0" err="1"/>
+              <a:t>TouchPhase</a:t>
+            </a:r>
+            <a:r>
+              <a:rPr lang="pt-BR" dirty="0"/>
+              <a:t> </a:t>
+            </a:r>
+            <a:r>
+              <a:rPr lang="pt-BR" dirty="0" err="1"/>
+              <a:t>phase</a:t>
+            </a:r>
+            <a:endParaRPr lang="pt-BR" dirty="0"/>
+          </a:p>
+          <a:p>
+            <a:pPr marL="457200" indent="-457200" algn="l">
+              <a:buFont typeface="Arial" panose="020B0604020202020204" pitchFamily="34" charset="0"/>
+              <a:buChar char="•"/>
+            </a:pPr>
+            <a:r>
+              <a:rPr lang="pt-BR" dirty="0"/>
+              <a:t>Vector2 position</a:t>
+            </a:r>
+          </a:p>
+          <a:p>
+            <a:pPr marL="457200" indent="-457200" algn="l">
+              <a:buFont typeface="Arial" panose="020B0604020202020204" pitchFamily="34" charset="0"/>
+              <a:buChar char="•"/>
+            </a:pPr>
+            <a:r>
+              <a:rPr lang="pt-BR" dirty="0" err="1"/>
+              <a:t>int</a:t>
+            </a:r>
+            <a:r>
+              <a:rPr lang="pt-BR" dirty="0"/>
+              <a:t> </a:t>
+            </a:r>
+            <a:r>
+              <a:rPr lang="pt-BR" dirty="0" err="1"/>
+              <a:t>tapCount</a:t>
             </a:r>
             <a:endParaRPr lang="pt-BR" dirty="0"/>
           </a:p>
@@ -4083,20 +4337,13 @@
     </p:spTree>
     <p:extLst>
       <p:ext uri="{BB962C8B-B14F-4D97-AF65-F5344CB8AC3E}">
-        <p14:creationId xmlns:p14="http://schemas.microsoft.com/office/powerpoint/2010/main" val="1404999815"/>
+        <p14:creationId xmlns:p14="http://schemas.microsoft.com/office/powerpoint/2010/main" val="1172932519"/>
       </p:ext>
     </p:extLst>
   </p:cSld>
   <p:clrMapOvr>
     <a:masterClrMapping/>
   </p:clrMapOvr>
-  <p:timing>
-    <p:tnLst>
-      <p:par>
-        <p:cTn id="1" dur="indefinite" restart="never" nodeType="tmRoot"/>
-      </p:par>
-    </p:tnLst>
-  </p:timing>
 </p:sld>
 </file>
 
@@ -4129,232 +4376,15 @@
         </p:nvSpPr>
         <p:spPr/>
         <p:txBody>
-          <a:bodyPr/>
-          <a:lstStyle/>
-          <a:p>
-            <a:r>
-              <a:rPr lang="pt-BR" dirty="0" smtClean="0"/>
-              <a:t>Correspondência de eixos</a:t>
-            </a:r>
-            <a:endParaRPr lang="pt-BR" dirty="0"/>
-          </a:p>
-        </p:txBody>
-      </p:sp>
-      <p:pic>
-        <p:nvPicPr>
-          <p:cNvPr id="2" name="Espaço Reservado para Conteúdo 1"/>
-          <p:cNvPicPr>
-            <a:picLocks noGrp="1" noChangeAspect="1"/>
-          </p:cNvPicPr>
-          <p:nvPr>
-            <p:ph idx="1"/>
-          </p:nvPr>
-        </p:nvPicPr>
-        <p:blipFill>
-          <a:blip r:embed="rId2"/>
-          <a:stretch>
-            <a:fillRect/>
-          </a:stretch>
-        </p:blipFill>
-        <p:spPr>
-          <a:xfrm>
-            <a:off x="1424010" y="1290638"/>
-            <a:ext cx="3210389" cy="4351337"/>
-          </a:xfrm>
-          <a:prstGeom prst="rect">
-            <a:avLst/>
-          </a:prstGeom>
-        </p:spPr>
-      </p:pic>
-      <p:pic>
-        <p:nvPicPr>
-          <p:cNvPr id="3" name="Imagem 2"/>
-          <p:cNvPicPr>
-            <a:picLocks noChangeAspect="1"/>
-          </p:cNvPicPr>
-          <p:nvPr/>
-        </p:nvPicPr>
-        <p:blipFill>
-          <a:blip r:embed="rId3"/>
-          <a:stretch>
-            <a:fillRect/>
-          </a:stretch>
-        </p:blipFill>
-        <p:spPr>
-          <a:xfrm>
-            <a:off x="5025357" y="1732756"/>
-            <a:ext cx="5857875" cy="3467100"/>
-          </a:xfrm>
-          <a:prstGeom prst="rect">
-            <a:avLst/>
-          </a:prstGeom>
-        </p:spPr>
-      </p:pic>
-    </p:spTree>
-    <p:extLst>
-      <p:ext uri="{BB962C8B-B14F-4D97-AF65-F5344CB8AC3E}">
-        <p14:creationId xmlns:p14="http://schemas.microsoft.com/office/powerpoint/2010/main" val="2530024638"/>
-      </p:ext>
-    </p:extLst>
-  </p:cSld>
-  <p:clrMapOvr>
-    <a:masterClrMapping/>
-  </p:clrMapOvr>
-  <p:timing>
-    <p:tnLst>
-      <p:par>
-        <p:cTn id="1" dur="indefinite" restart="never" nodeType="tmRoot"/>
-      </p:par>
-    </p:tnLst>
-  </p:timing>
-</p:sld>
-</file>
-
-<file path=ppt/slides/slide6.xml><?xml version="1.0" encoding="utf-8"?>
-<p:sld xmlns:a="http://schemas.openxmlformats.org/drawingml/2006/main" xmlns:r="http://schemas.openxmlformats.org/officeDocument/2006/relationships" xmlns:p="http://schemas.openxmlformats.org/presentationml/2006/main">
-  <p:cSld>
-    <p:spTree>
-      <p:nvGrpSpPr>
-        <p:cNvPr id="1" name=""/>
-        <p:cNvGrpSpPr/>
-        <p:nvPr/>
-      </p:nvGrpSpPr>
-      <p:grpSpPr>
-        <a:xfrm>
-          <a:off x="0" y="0"/>
-          <a:ext cx="0" cy="0"/>
-          <a:chOff x="0" y="0"/>
-          <a:chExt cx="0" cy="0"/>
-        </a:xfrm>
-      </p:grpSpPr>
-      <p:sp>
-        <p:nvSpPr>
-          <p:cNvPr id="5" name="Título 4"/>
-          <p:cNvSpPr>
-            <a:spLocks noGrp="1"/>
-          </p:cNvSpPr>
-          <p:nvPr>
-            <p:ph type="title"/>
-          </p:nvPr>
-        </p:nvSpPr>
-        <p:spPr/>
-        <p:txBody>
-          <a:bodyPr/>
-          <a:lstStyle/>
-          <a:p>
-            <a:r>
-              <a:rPr lang="pt-BR" dirty="0" smtClean="0"/>
-              <a:t>Valores obtidos</a:t>
-            </a:r>
-            <a:endParaRPr lang="pt-BR" dirty="0"/>
-          </a:p>
-        </p:txBody>
-      </p:sp>
-      <p:sp>
-        <p:nvSpPr>
-          <p:cNvPr id="6" name="Espaço Reservado para Conteúdo 5"/>
-          <p:cNvSpPr>
-            <a:spLocks noGrp="1"/>
-          </p:cNvSpPr>
-          <p:nvPr>
-            <p:ph idx="1"/>
-          </p:nvPr>
-        </p:nvSpPr>
-        <p:spPr/>
-        <p:txBody>
           <a:bodyPr>
             <a:normAutofit/>
           </a:bodyPr>
           <a:lstStyle/>
           <a:p>
             <a:r>
-              <a:rPr lang="pt-BR" dirty="0" smtClean="0"/>
-              <a:t>O intervalo de valores dos eixos do acelerômetro</a:t>
-            </a:r>
-            <a:br>
-              <a:rPr lang="pt-BR" dirty="0" smtClean="0"/>
-            </a:br>
-            <a:r>
-              <a:rPr lang="pt-BR" dirty="0" smtClean="0"/>
-              <a:t>estão entre -1 e 1.</a:t>
-            </a:r>
-          </a:p>
-          <a:p>
-            <a:r>
-              <a:rPr lang="pt-BR" dirty="0" smtClean="0"/>
-              <a:t>Isso possibilita usá-los do mesmo modo que o método </a:t>
-            </a:r>
-            <a:r>
-              <a:rPr lang="pt-BR" dirty="0" err="1" smtClean="0"/>
-              <a:t>Input.GetAxis</a:t>
-            </a:r>
-            <a:r>
-              <a:rPr lang="pt-BR" dirty="0" smtClean="0"/>
-              <a:t>().</a:t>
-            </a:r>
-            <a:endParaRPr lang="pt-BR" dirty="0"/>
-          </a:p>
-        </p:txBody>
-      </p:sp>
-    </p:spTree>
-    <p:extLst>
-      <p:ext uri="{BB962C8B-B14F-4D97-AF65-F5344CB8AC3E}">
-        <p14:creationId xmlns:p14="http://schemas.microsoft.com/office/powerpoint/2010/main" val="4174736382"/>
-      </p:ext>
-    </p:extLst>
-  </p:cSld>
-  <p:clrMapOvr>
-    <a:masterClrMapping/>
-  </p:clrMapOvr>
-  <p:timing>
-    <p:tnLst>
-      <p:par>
-        <p:cTn id="1" dur="indefinite" restart="never" nodeType="tmRoot"/>
-      </p:par>
-    </p:tnLst>
-  </p:timing>
-</p:sld>
-</file>
-
-<file path=ppt/slides/slide7.xml><?xml version="1.0" encoding="utf-8"?>
-<p:sld xmlns:a="http://schemas.openxmlformats.org/drawingml/2006/main" xmlns:r="http://schemas.openxmlformats.org/officeDocument/2006/relationships" xmlns:p="http://schemas.openxmlformats.org/presentationml/2006/main">
-  <p:cSld>
-    <p:spTree>
-      <p:nvGrpSpPr>
-        <p:cNvPr id="1" name=""/>
-        <p:cNvGrpSpPr/>
-        <p:nvPr/>
-      </p:nvGrpSpPr>
-      <p:grpSpPr>
-        <a:xfrm>
-          <a:off x="0" y="0"/>
-          <a:ext cx="0" cy="0"/>
-          <a:chOff x="0" y="0"/>
-          <a:chExt cx="0" cy="0"/>
-        </a:xfrm>
-      </p:grpSpPr>
-      <p:sp>
-        <p:nvSpPr>
-          <p:cNvPr id="5" name="Título 4"/>
-          <p:cNvSpPr>
-            <a:spLocks noGrp="1"/>
-          </p:cNvSpPr>
-          <p:nvPr>
-            <p:ph type="title"/>
-          </p:nvPr>
-        </p:nvSpPr>
-        <p:spPr/>
-        <p:txBody>
-          <a:bodyPr>
-            <a:normAutofit/>
-          </a:bodyPr>
-          <a:lstStyle/>
-          <a:p>
-            <a:r>
-              <a:rPr lang="pt-BR" dirty="0" smtClean="0"/>
+              <a:rPr lang="pt-BR" dirty="0"/>
               <a:t>Referências</a:t>
             </a:r>
-            <a:endParaRPr lang="pt-BR" dirty="0"/>
           </a:p>
         </p:txBody>
       </p:sp>
@@ -4385,7 +4415,7 @@
               <a:buAutoNum type="arabicPeriod"/>
             </a:pPr>
             <a:r>
-              <a:rPr lang="en-US" dirty="0" smtClean="0"/>
+              <a:rPr lang="en-US" dirty="0"/>
               <a:t>Unity Technologies. </a:t>
             </a:r>
             <a:r>
@@ -4393,33 +4423,33 @@
               <a:t>Mobile device input</a:t>
             </a:r>
             <a:r>
-              <a:rPr lang="en-US" dirty="0" smtClean="0"/>
-              <a:t>. </a:t>
-            </a:r>
-            <a:r>
-              <a:rPr lang="en-US" dirty="0" err="1" smtClean="0"/>
+              <a:rPr lang="en-US" dirty="0"/>
+              <a:t>. Documentation. </a:t>
+            </a:r>
+            <a:r>
+              <a:rPr lang="en-US" dirty="0" err="1"/>
               <a:t>Disponível</a:t>
             </a:r>
             <a:r>
-              <a:rPr lang="en-US" dirty="0" smtClean="0"/>
+              <a:rPr lang="en-US" dirty="0"/>
               <a:t> </a:t>
             </a:r>
             <a:r>
-              <a:rPr lang="en-US" dirty="0" err="1" smtClean="0"/>
+              <a:rPr lang="en-US" dirty="0" err="1"/>
               <a:t>em</a:t>
             </a:r>
             <a:r>
-              <a:rPr lang="en-US" dirty="0" smtClean="0"/>
+              <a:rPr lang="en-US" dirty="0"/>
               <a:t>: </a:t>
             </a:r>
             <a:r>
-              <a:rPr lang="pt-BR" dirty="0" smtClean="0">
+              <a:rPr lang="pt-BR" dirty="0">
                 <a:hlinkClick r:id="rId2"/>
               </a:rPr>
               <a:t>https://docs.unity3d.com/Manual/MobileInput.html</a:t>
             </a:r>
             <a:r>
-              <a:rPr lang="pt-BR" dirty="0" smtClean="0"/>
+              <a:rPr lang="pt-BR" dirty="0"/>
               <a:t>.</a:t>
             </a:r>
           </a:p>
@@ -4429,19 +4459,84 @@
               <a:buAutoNum type="arabicPeriod"/>
             </a:pPr>
             <a:r>
+              <a:rPr lang="pt-BR" dirty="0" err="1"/>
+              <a:t>Unity</a:t>
+            </a:r>
+            <a:r>
+              <a:rPr lang="pt-BR" dirty="0"/>
+              <a:t>. </a:t>
+            </a:r>
+            <a:r>
+              <a:rPr lang="pt-BR" b="1" dirty="0" err="1"/>
+              <a:t>Multi</a:t>
+            </a:r>
+            <a:r>
+              <a:rPr lang="pt-BR" b="1" dirty="0"/>
+              <a:t> Touch Input</a:t>
+            </a:r>
+            <a:r>
+              <a:rPr lang="pt-BR" dirty="0"/>
+              <a:t>. </a:t>
+            </a:r>
+            <a:r>
+              <a:rPr lang="pt-BR" dirty="0" err="1"/>
+              <a:t>Documentation</a:t>
+            </a:r>
+            <a:r>
+              <a:rPr lang="pt-BR" dirty="0"/>
+              <a:t>. Disponível em: </a:t>
+            </a:r>
+            <a:r>
               <a:rPr lang="pt-BR" dirty="0">
                 <a:hlinkClick r:id="rId3"/>
               </a:rPr>
               <a:t>https://unity3d.com/pt/learn/tutorials/topics/mobile-touch/multi-touch-input</a:t>
             </a:r>
-            <a:endParaRPr lang="pt-BR" dirty="0" smtClean="0"/>
+            <a:endParaRPr lang="pt-BR" dirty="0"/>
+          </a:p>
+          <a:p>
+            <a:pPr marL="514350" indent="-514350" algn="l">
+              <a:buFont typeface="+mj-lt"/>
+              <a:buAutoNum type="arabicPeriod"/>
+            </a:pPr>
+            <a:r>
+              <a:rPr lang="pt-BR" dirty="0" err="1"/>
+              <a:t>Unity</a:t>
+            </a:r>
+            <a:r>
+              <a:rPr lang="pt-BR" dirty="0"/>
+              <a:t>. </a:t>
+            </a:r>
+            <a:r>
+              <a:rPr lang="pt-BR" b="1" dirty="0"/>
+              <a:t>Touch</a:t>
+            </a:r>
+            <a:r>
+              <a:rPr lang="pt-BR" dirty="0"/>
+              <a:t>. </a:t>
+            </a:r>
+            <a:r>
+              <a:rPr lang="pt-BR" dirty="0" err="1"/>
+              <a:t>Documentation</a:t>
+            </a:r>
+            <a:r>
+              <a:rPr lang="pt-BR" dirty="0"/>
+              <a:t>. Disponível em: </a:t>
+            </a:r>
+            <a:r>
+              <a:rPr lang="en-US" dirty="0">
+                <a:hlinkClick r:id="rId4"/>
+              </a:rPr>
+              <a:t>https://docs.unity3d.com/ScriptReference/Touch.html</a:t>
+            </a:r>
+            <a:endParaRPr lang="pt-BR" dirty="0"/>
           </a:p>
           <a:p>
             <a:pPr algn="l"/>
-            <a:endParaRPr lang="pt-BR" dirty="0" smtClean="0"/>
-          </a:p>
-          <a:p>
-            <a:endParaRPr lang="pt-BR" dirty="0" smtClean="0"/>
+            <a:endParaRPr lang="pt-BR" dirty="0"/>
+          </a:p>
+          <a:p>
+            <a:endParaRPr lang="pt-BR" dirty="0"/>
           </a:p>
           <a:p>
             <a:endParaRPr lang="pt-BR" dirty="0"/>
@@ -4458,13 +4553,6 @@
   <p:clrMapOvr>
     <a:masterClrMapping/>
   </p:clrMapOvr>
-  <p:timing>
-    <p:tnLst>
-      <p:par>
-        <p:cTn id="1" dur="indefinite" restart="never" nodeType="tmRoot"/>
-      </p:par>
-    </p:tnLst>
-  </p:timing>
 </p:sld>
 </file>
 

</xml_diff>